<commit_message>
Update PP, add guideline notes
After looking at rubric, added sections to PP, still need content,
included guideline from rubric in .doc
</commit_message>
<xml_diff>
--- a/Presentation/12.8.15 Presentation (Revised).pptx
+++ b/Presentation/12.8.15 Presentation (Revised).pptx
@@ -5,20 +5,26 @@
     <p:sldMasterId id="2147483648" r:id="rId1"/>
   </p:sldMasterIdLst>
   <p:notesMasterIdLst>
-    <p:notesMasterId r:id="rId13"/>
+    <p:notesMasterId r:id="rId19"/>
   </p:notesMasterIdLst>
   <p:sldIdLst>
     <p:sldId id="256" r:id="rId2"/>
     <p:sldId id="257" r:id="rId3"/>
     <p:sldId id="261" r:id="rId4"/>
-    <p:sldId id="263" r:id="rId5"/>
-    <p:sldId id="264" r:id="rId6"/>
-    <p:sldId id="265" r:id="rId7"/>
-    <p:sldId id="260" r:id="rId8"/>
-    <p:sldId id="258" r:id="rId9"/>
-    <p:sldId id="266" r:id="rId10"/>
-    <p:sldId id="262" r:id="rId11"/>
-    <p:sldId id="267" r:id="rId12"/>
+    <p:sldId id="268" r:id="rId5"/>
+    <p:sldId id="263" r:id="rId6"/>
+    <p:sldId id="264" r:id="rId7"/>
+    <p:sldId id="265" r:id="rId8"/>
+    <p:sldId id="269" r:id="rId9"/>
+    <p:sldId id="260" r:id="rId10"/>
+    <p:sldId id="258" r:id="rId11"/>
+    <p:sldId id="270" r:id="rId12"/>
+    <p:sldId id="262" r:id="rId13"/>
+    <p:sldId id="266" r:id="rId14"/>
+    <p:sldId id="272" r:id="rId15"/>
+    <p:sldId id="273" r:id="rId16"/>
+    <p:sldId id="267" r:id="rId17"/>
+    <p:sldId id="271" r:id="rId18"/>
   </p:sldIdLst>
   <p:sldSz cx="12192000" cy="6858000"/>
   <p:notesSz cx="6858000" cy="9144000"/>
@@ -207,7 +213,7 @@
           <a:p>
             <a:fld id="{5B6AB509-4183-4579-9787-242A2BB957B8}" type="datetimeFigureOut">
               <a:rPr lang="en-US"/>
-              <a:t>12/3/2015</a:t>
+              <a:t>12/4/2015</a:t>
             </a:fld>
             <a:endParaRPr lang="en-US"/>
           </a:p>
@@ -819,7 +825,7 @@
           <a:p>
             <a:fld id="{7D90AB93-7EBB-40C3-AABE-B1527F40B7D6}" type="slidenum">
               <a:rPr lang="en-US"/>
-              <a:t>7</a:t>
+              <a:t>9</a:t>
             </a:fld>
             <a:endParaRPr lang="en-US"/>
           </a:p>
@@ -908,7 +914,7 @@
           <a:p>
             <a:fld id="{7D90AB93-7EBB-40C3-AABE-B1527F40B7D6}" type="slidenum">
               <a:rPr lang="en-US"/>
-              <a:t>8</a:t>
+              <a:t>10</a:t>
             </a:fld>
             <a:endParaRPr lang="en-US"/>
           </a:p>
@@ -992,7 +998,7 @@
           <a:p>
             <a:fld id="{7D90AB93-7EBB-40C3-AABE-B1527F40B7D6}" type="slidenum">
               <a:rPr lang="en-US"/>
-              <a:t>10</a:t>
+              <a:t>12</a:t>
             </a:fld>
             <a:endParaRPr lang="en-US"/>
           </a:p>
@@ -1200,7 +1206,7 @@
             <a:fld id="{B61BEF0D-F0BB-DE4B-95CE-6DB70DBA9567}" type="datetimeFigureOut">
               <a:rPr lang="en-US" dirty="0"/>
               <a:pPr/>
-              <a:t>12/3/2015</a:t>
+              <a:t>12/4/2015</a:t>
             </a:fld>
             <a:endParaRPr lang="en-US" dirty="0"/>
           </a:p>
@@ -1535,7 +1541,7 @@
             <a:fld id="{B61BEF0D-F0BB-DE4B-95CE-6DB70DBA9567}" type="datetimeFigureOut">
               <a:rPr lang="en-US" dirty="0"/>
               <a:pPr/>
-              <a:t>12/3/2015</a:t>
+              <a:t>12/4/2015</a:t>
             </a:fld>
             <a:endParaRPr lang="en-US" dirty="0"/>
           </a:p>
@@ -1933,7 +1939,7 @@
             <a:fld id="{B61BEF0D-F0BB-DE4B-95CE-6DB70DBA9567}" type="datetimeFigureOut">
               <a:rPr lang="en-US" dirty="0"/>
               <a:pPr/>
-              <a:t>12/3/2015</a:t>
+              <a:t>12/4/2015</a:t>
             </a:fld>
             <a:endParaRPr lang="en-US" dirty="0"/>
           </a:p>
@@ -2266,7 +2272,7 @@
             <a:fld id="{B61BEF0D-F0BB-DE4B-95CE-6DB70DBA9567}" type="datetimeFigureOut">
               <a:rPr lang="en-US" dirty="0"/>
               <a:pPr/>
-              <a:t>12/3/2015</a:t>
+              <a:t>12/4/2015</a:t>
             </a:fld>
             <a:endParaRPr lang="en-US" dirty="0"/>
           </a:p>
@@ -2583,7 +2589,7 @@
             <a:fld id="{B61BEF0D-F0BB-DE4B-95CE-6DB70DBA9567}" type="datetimeFigureOut">
               <a:rPr lang="en-US" dirty="0"/>
               <a:pPr/>
-              <a:t>12/3/2015</a:t>
+              <a:t>12/4/2015</a:t>
             </a:fld>
             <a:endParaRPr lang="en-US" dirty="0"/>
           </a:p>
@@ -2976,7 +2982,7 @@
             <a:fld id="{B61BEF0D-F0BB-DE4B-95CE-6DB70DBA9567}" type="datetimeFigureOut">
               <a:rPr lang="en-US" dirty="0"/>
               <a:pPr/>
-              <a:t>12/3/2015</a:t>
+              <a:t>12/4/2015</a:t>
             </a:fld>
             <a:endParaRPr lang="en-US" dirty="0"/>
           </a:p>
@@ -3230,7 +3236,7 @@
             <a:fld id="{B61BEF0D-F0BB-DE4B-95CE-6DB70DBA9567}" type="datetimeFigureOut">
               <a:rPr lang="en-US" dirty="0"/>
               <a:pPr/>
-              <a:t>12/3/2015</a:t>
+              <a:t>12/4/2015</a:t>
             </a:fld>
             <a:endParaRPr lang="en-US" dirty="0"/>
           </a:p>
@@ -3489,7 +3495,7 @@
             <a:fld id="{B61BEF0D-F0BB-DE4B-95CE-6DB70DBA9567}" type="datetimeFigureOut">
               <a:rPr lang="en-US" dirty="0"/>
               <a:pPr/>
-              <a:t>12/3/2015</a:t>
+              <a:t>12/4/2015</a:t>
             </a:fld>
             <a:endParaRPr lang="en-US" dirty="0"/>
           </a:p>
@@ -3748,7 +3754,7 @@
             <a:fld id="{B61BEF0D-F0BB-DE4B-95CE-6DB70DBA9567}" type="datetimeFigureOut">
               <a:rPr lang="en-US" dirty="0"/>
               <a:pPr/>
-              <a:t>12/3/2015</a:t>
+              <a:t>12/4/2015</a:t>
             </a:fld>
             <a:endParaRPr lang="en-US" dirty="0"/>
           </a:p>
@@ -4074,7 +4080,7 @@
             <a:fld id="{B61BEF0D-F0BB-DE4B-95CE-6DB70DBA9567}" type="datetimeFigureOut">
               <a:rPr lang="en-US" dirty="0"/>
               <a:pPr/>
-              <a:t>12/3/2015</a:t>
+              <a:t>12/4/2015</a:t>
             </a:fld>
             <a:endParaRPr lang="en-US" dirty="0"/>
           </a:p>
@@ -4394,7 +4400,7 @@
             <a:fld id="{B61BEF0D-F0BB-DE4B-95CE-6DB70DBA9567}" type="datetimeFigureOut">
               <a:rPr lang="en-US" dirty="0"/>
               <a:pPr/>
-              <a:t>12/3/2015</a:t>
+              <a:t>12/4/2015</a:t>
             </a:fld>
             <a:endParaRPr lang="en-US" dirty="0"/>
           </a:p>
@@ -4848,7 +4854,7 @@
             <a:fld id="{B61BEF0D-F0BB-DE4B-95CE-6DB70DBA9567}" type="datetimeFigureOut">
               <a:rPr lang="en-US" dirty="0"/>
               <a:pPr/>
-              <a:t>12/3/2015</a:t>
+              <a:t>12/4/2015</a:t>
             </a:fld>
             <a:endParaRPr lang="en-US" dirty="0"/>
           </a:p>
@@ -5050,7 +5056,7 @@
             <a:fld id="{B61BEF0D-F0BB-DE4B-95CE-6DB70DBA9567}" type="datetimeFigureOut">
               <a:rPr lang="en-US" dirty="0"/>
               <a:pPr/>
-              <a:t>12/3/2015</a:t>
+              <a:t>12/4/2015</a:t>
             </a:fld>
             <a:endParaRPr lang="en-US" dirty="0"/>
           </a:p>
@@ -5224,7 +5230,7 @@
             <a:fld id="{B61BEF0D-F0BB-DE4B-95CE-6DB70DBA9567}" type="datetimeFigureOut">
               <a:rPr lang="en-US" dirty="0"/>
               <a:pPr/>
-              <a:t>12/3/2015</a:t>
+              <a:t>12/4/2015</a:t>
             </a:fld>
             <a:endParaRPr lang="en-US" dirty="0"/>
           </a:p>
@@ -5554,7 +5560,7 @@
             <a:fld id="{B61BEF0D-F0BB-DE4B-95CE-6DB70DBA9567}" type="datetimeFigureOut">
               <a:rPr lang="en-US" dirty="0"/>
               <a:pPr/>
-              <a:t>12/3/2015</a:t>
+              <a:t>12/4/2015</a:t>
             </a:fld>
             <a:endParaRPr lang="en-US" dirty="0"/>
           </a:p>
@@ -5896,7 +5902,7 @@
             <a:fld id="{B61BEF0D-F0BB-DE4B-95CE-6DB70DBA9567}" type="datetimeFigureOut">
               <a:rPr lang="en-US" dirty="0"/>
               <a:pPr/>
-              <a:t>12/3/2015</a:t>
+              <a:t>12/4/2015</a:t>
             </a:fld>
             <a:endParaRPr lang="en-US" dirty="0"/>
           </a:p>
@@ -8010,7 +8016,7 @@
             <a:fld id="{B61BEF0D-F0BB-DE4B-95CE-6DB70DBA9567}" type="datetimeFigureOut">
               <a:rPr lang="en-US" dirty="0"/>
               <a:pPr/>
-              <a:t>12/3/2015</a:t>
+              <a:t>12/4/2015</a:t>
             </a:fld>
             <a:endParaRPr lang="en-US" dirty="0"/>
           </a:p>
@@ -8655,7 +8661,7 @@
           <a:p>
             <a:r>
               <a:rPr lang="en-US" dirty="0"/>
-              <a:t>Prototype</a:t>
+              <a:t>Project Management Plan</a:t>
             </a:r>
           </a:p>
         </p:txBody>
@@ -8672,17 +8678,69 @@
         </p:nvSpPr>
         <p:spPr/>
         <p:txBody>
-          <a:bodyPr/>
-          <a:lstStyle/>
-          <a:p>
-            <a:endParaRPr lang="en-US"/>
+          <a:bodyPr vert="horz" lIns="91440" tIns="45720" rIns="91440" bIns="45720" rtlCol="0" anchor="t">
+            <a:normAutofit/>
+          </a:bodyPr>
+          <a:lstStyle/>
+          <a:p>
+            <a:r>
+              <a:rPr lang="en-US" dirty="0"/>
+              <a:t>Project Organization</a:t>
+            </a:r>
+          </a:p>
+          <a:p>
+            <a:pPr lvl="1"/>
+            <a:r>
+              <a:rPr lang="en-US" sz="1800" dirty="0" smtClean="0"/>
+              <a:t>Scrum/Kanban process (Trello)</a:t>
+            </a:r>
+            <a:endParaRPr lang="en-US" sz="1800" dirty="0"/>
+          </a:p>
+          <a:p>
+            <a:r>
+              <a:rPr lang="en-US" dirty="0"/>
+              <a:t>Risk Analysis</a:t>
+            </a:r>
+          </a:p>
+          <a:p>
+            <a:pPr lvl="1"/>
+            <a:r>
+              <a:rPr lang="en-US" sz="1800" dirty="0"/>
+              <a:t>Feature Overload</a:t>
+            </a:r>
+          </a:p>
+          <a:p>
+            <a:r>
+              <a:rPr lang="en-US" dirty="0"/>
+              <a:t>Hardware/Software Requirements</a:t>
+            </a:r>
+          </a:p>
+          <a:p>
+            <a:r>
+              <a:rPr lang="en-US" dirty="0"/>
+              <a:t>Project Schedule</a:t>
+            </a:r>
+          </a:p>
+          <a:p>
+            <a:pPr lvl="1"/>
+            <a:r>
+              <a:rPr lang="en-US" sz="1800" dirty="0"/>
+              <a:t>Reach new milestones each 2-week sprint</a:t>
+            </a:r>
+          </a:p>
+          <a:p>
+            <a:pPr lvl="1"/>
+            <a:r>
+              <a:rPr lang="en-US" sz="1800" dirty="0"/>
+              <a:t>SCRUM meetings and Client Meetings</a:t>
+            </a:r>
           </a:p>
         </p:txBody>
       </p:sp>
     </p:spTree>
     <p:extLst>
       <p:ext uri="{BB962C8B-B14F-4D97-AF65-F5344CB8AC3E}">
-        <p14:creationId xmlns:p14="http://schemas.microsoft.com/office/powerpoint/2010/main" val="2018556856"/>
+        <p14:creationId xmlns:p14="http://schemas.microsoft.com/office/powerpoint/2010/main" val="1768054810"/>
       </p:ext>
     </p:extLst>
   </p:cSld>
@@ -8716,6 +8774,375 @@
             <a:spLocks noGrp="1"/>
           </p:cNvSpPr>
           <p:nvPr>
+            <p:ph type="ctrTitle"/>
+          </p:nvPr>
+        </p:nvSpPr>
+        <p:spPr/>
+        <p:txBody>
+          <a:bodyPr/>
+          <a:lstStyle/>
+          <a:p>
+            <a:r>
+              <a:rPr lang="en-US" dirty="0" smtClean="0"/>
+              <a:t>REQS ABOVE</a:t>
+            </a:r>
+            <a:br>
+              <a:rPr lang="en-US" dirty="0" smtClean="0"/>
+            </a:br>
+            <a:r>
+              <a:rPr lang="en-US" dirty="0" smtClean="0"/>
+              <a:t>PROTOTYPE DEMO BELOW</a:t>
+            </a:r>
+            <a:endParaRPr lang="en-US" dirty="0"/>
+          </a:p>
+        </p:txBody>
+      </p:sp>
+      <p:sp>
+        <p:nvSpPr>
+          <p:cNvPr id="3" name="Subtitle 2"/>
+          <p:cNvSpPr>
+            <a:spLocks noGrp="1"/>
+          </p:cNvSpPr>
+          <p:nvPr>
+            <p:ph type="subTitle" idx="1"/>
+          </p:nvPr>
+        </p:nvSpPr>
+        <p:spPr/>
+        <p:txBody>
+          <a:bodyPr/>
+          <a:lstStyle/>
+          <a:p>
+            <a:endParaRPr lang="en-US"/>
+          </a:p>
+        </p:txBody>
+      </p:sp>
+    </p:spTree>
+    <p:extLst>
+      <p:ext uri="{BB962C8B-B14F-4D97-AF65-F5344CB8AC3E}">
+        <p14:creationId xmlns:p14="http://schemas.microsoft.com/office/powerpoint/2010/main" val="51987764"/>
+      </p:ext>
+    </p:extLst>
+  </p:cSld>
+  <p:clrMapOvr>
+    <a:masterClrMapping/>
+  </p:clrMapOvr>
+</p:sld>
+</file>
+
+<file path=ppt/slides/slide12.xml><?xml version="1.0" encoding="utf-8"?>
+<p:sld xmlns:a="http://schemas.openxmlformats.org/drawingml/2006/main" xmlns:r="http://schemas.openxmlformats.org/officeDocument/2006/relationships" xmlns:p="http://schemas.openxmlformats.org/presentationml/2006/main">
+  <p:cSld>
+    <p:spTree>
+      <p:nvGrpSpPr>
+        <p:cNvPr id="1" name=""/>
+        <p:cNvGrpSpPr/>
+        <p:nvPr/>
+      </p:nvGrpSpPr>
+      <p:grpSpPr>
+        <a:xfrm>
+          <a:off x="0" y="0"/>
+          <a:ext cx="0" cy="0"/>
+          <a:chOff x="0" y="0"/>
+          <a:chExt cx="0" cy="0"/>
+        </a:xfrm>
+      </p:grpSpPr>
+      <p:sp>
+        <p:nvSpPr>
+          <p:cNvPr id="2" name="Title 1"/>
+          <p:cNvSpPr>
+            <a:spLocks noGrp="1"/>
+          </p:cNvSpPr>
+          <p:nvPr>
+            <p:ph type="title"/>
+          </p:nvPr>
+        </p:nvSpPr>
+        <p:spPr/>
+        <p:txBody>
+          <a:bodyPr/>
+          <a:lstStyle/>
+          <a:p>
+            <a:r>
+              <a:rPr lang="en-US" dirty="0"/>
+              <a:t>Prototype</a:t>
+            </a:r>
+          </a:p>
+        </p:txBody>
+      </p:sp>
+      <p:sp>
+        <p:nvSpPr>
+          <p:cNvPr id="3" name="Content Placeholder 2"/>
+          <p:cNvSpPr>
+            <a:spLocks noGrp="1"/>
+          </p:cNvSpPr>
+          <p:nvPr>
+            <p:ph idx="1"/>
+          </p:nvPr>
+        </p:nvSpPr>
+        <p:spPr/>
+        <p:txBody>
+          <a:bodyPr/>
+          <a:lstStyle/>
+          <a:p>
+            <a:endParaRPr lang="en-US"/>
+          </a:p>
+        </p:txBody>
+      </p:sp>
+    </p:spTree>
+    <p:extLst>
+      <p:ext uri="{BB962C8B-B14F-4D97-AF65-F5344CB8AC3E}">
+        <p14:creationId xmlns:p14="http://schemas.microsoft.com/office/powerpoint/2010/main" val="2018556856"/>
+      </p:ext>
+    </p:extLst>
+  </p:cSld>
+  <p:clrMapOvr>
+    <a:masterClrMapping/>
+  </p:clrMapOvr>
+</p:sld>
+</file>
+
+<file path=ppt/slides/slide13.xml><?xml version="1.0" encoding="utf-8"?>
+<p:sld xmlns:a="http://schemas.openxmlformats.org/drawingml/2006/main" xmlns:r="http://schemas.openxmlformats.org/officeDocument/2006/relationships" xmlns:p="http://schemas.openxmlformats.org/presentationml/2006/main">
+  <p:cSld>
+    <p:spTree>
+      <p:nvGrpSpPr>
+        <p:cNvPr id="1" name=""/>
+        <p:cNvGrpSpPr/>
+        <p:nvPr/>
+      </p:nvGrpSpPr>
+      <p:grpSpPr>
+        <a:xfrm>
+          <a:off x="0" y="0"/>
+          <a:ext cx="0" cy="0"/>
+          <a:chOff x="0" y="0"/>
+          <a:chExt cx="0" cy="0"/>
+        </a:xfrm>
+      </p:grpSpPr>
+      <p:sp>
+        <p:nvSpPr>
+          <p:cNvPr id="2" name="Title 1"/>
+          <p:cNvSpPr>
+            <a:spLocks noGrp="1"/>
+          </p:cNvSpPr>
+          <p:nvPr>
+            <p:ph type="title"/>
+          </p:nvPr>
+        </p:nvSpPr>
+        <p:spPr/>
+        <p:txBody>
+          <a:bodyPr/>
+          <a:lstStyle/>
+          <a:p>
+            <a:r>
+              <a:rPr lang="en-US" dirty="0" smtClean="0"/>
+              <a:t>PROTOTYPE ABOVE</a:t>
+            </a:r>
+            <a:br>
+              <a:rPr lang="en-US" dirty="0" smtClean="0"/>
+            </a:br>
+            <a:r>
+              <a:rPr lang="en-US" dirty="0" smtClean="0"/>
+              <a:t>QA RISK ANALYSIS BELOW</a:t>
+            </a:r>
+            <a:endParaRPr lang="en-US" dirty="0"/>
+          </a:p>
+        </p:txBody>
+      </p:sp>
+      <p:sp>
+        <p:nvSpPr>
+          <p:cNvPr id="3" name="Content Placeholder 2"/>
+          <p:cNvSpPr>
+            <a:spLocks noGrp="1"/>
+          </p:cNvSpPr>
+          <p:nvPr>
+            <p:ph idx="1"/>
+          </p:nvPr>
+        </p:nvSpPr>
+        <p:spPr/>
+        <p:txBody>
+          <a:bodyPr/>
+          <a:lstStyle/>
+          <a:p>
+            <a:endParaRPr lang="en-US" dirty="0"/>
+          </a:p>
+        </p:txBody>
+      </p:sp>
+    </p:spTree>
+    <p:extLst>
+      <p:ext uri="{BB962C8B-B14F-4D97-AF65-F5344CB8AC3E}">
+        <p14:creationId xmlns:p14="http://schemas.microsoft.com/office/powerpoint/2010/main" val="4148209602"/>
+      </p:ext>
+    </p:extLst>
+  </p:cSld>
+  <p:clrMapOvr>
+    <a:masterClrMapping/>
+  </p:clrMapOvr>
+</p:sld>
+</file>
+
+<file path=ppt/slides/slide14.xml><?xml version="1.0" encoding="utf-8"?>
+<p:sld xmlns:a="http://schemas.openxmlformats.org/drawingml/2006/main" xmlns:r="http://schemas.openxmlformats.org/officeDocument/2006/relationships" xmlns:p="http://schemas.openxmlformats.org/presentationml/2006/main">
+  <p:cSld>
+    <p:spTree>
+      <p:nvGrpSpPr>
+        <p:cNvPr id="1" name=""/>
+        <p:cNvGrpSpPr/>
+        <p:nvPr/>
+      </p:nvGrpSpPr>
+      <p:grpSpPr>
+        <a:xfrm>
+          <a:off x="0" y="0"/>
+          <a:ext cx="0" cy="0"/>
+          <a:chOff x="0" y="0"/>
+          <a:chExt cx="0" cy="0"/>
+        </a:xfrm>
+      </p:grpSpPr>
+      <p:sp>
+        <p:nvSpPr>
+          <p:cNvPr id="2" name="Title 1"/>
+          <p:cNvSpPr>
+            <a:spLocks noGrp="1"/>
+          </p:cNvSpPr>
+          <p:nvPr>
+            <p:ph type="title"/>
+          </p:nvPr>
+        </p:nvSpPr>
+        <p:spPr/>
+        <p:txBody>
+          <a:bodyPr/>
+          <a:lstStyle/>
+          <a:p>
+            <a:r>
+              <a:rPr lang="en-US" dirty="0" smtClean="0"/>
+              <a:t>QUALITY ASSURANCE</a:t>
+            </a:r>
+            <a:endParaRPr lang="en-US" dirty="0"/>
+          </a:p>
+        </p:txBody>
+      </p:sp>
+      <p:sp>
+        <p:nvSpPr>
+          <p:cNvPr id="3" name="Content Placeholder 2"/>
+          <p:cNvSpPr>
+            <a:spLocks noGrp="1"/>
+          </p:cNvSpPr>
+          <p:nvPr>
+            <p:ph idx="1"/>
+          </p:nvPr>
+        </p:nvSpPr>
+        <p:spPr/>
+        <p:txBody>
+          <a:bodyPr/>
+          <a:lstStyle/>
+          <a:p>
+            <a:endParaRPr lang="en-US"/>
+          </a:p>
+        </p:txBody>
+      </p:sp>
+    </p:spTree>
+    <p:extLst>
+      <p:ext uri="{BB962C8B-B14F-4D97-AF65-F5344CB8AC3E}">
+        <p14:creationId xmlns:p14="http://schemas.microsoft.com/office/powerpoint/2010/main" val="3755474298"/>
+      </p:ext>
+    </p:extLst>
+  </p:cSld>
+  <p:clrMapOvr>
+    <a:masterClrMapping/>
+  </p:clrMapOvr>
+</p:sld>
+</file>
+
+<file path=ppt/slides/slide15.xml><?xml version="1.0" encoding="utf-8"?>
+<p:sld xmlns:a="http://schemas.openxmlformats.org/drawingml/2006/main" xmlns:r="http://schemas.openxmlformats.org/officeDocument/2006/relationships" xmlns:p="http://schemas.openxmlformats.org/presentationml/2006/main">
+  <p:cSld>
+    <p:spTree>
+      <p:nvGrpSpPr>
+        <p:cNvPr id="1" name=""/>
+        <p:cNvGrpSpPr/>
+        <p:nvPr/>
+      </p:nvGrpSpPr>
+      <p:grpSpPr>
+        <a:xfrm>
+          <a:off x="0" y="0"/>
+          <a:ext cx="0" cy="0"/>
+          <a:chOff x="0" y="0"/>
+          <a:chExt cx="0" cy="0"/>
+        </a:xfrm>
+      </p:grpSpPr>
+      <p:sp>
+        <p:nvSpPr>
+          <p:cNvPr id="2" name="Title 1"/>
+          <p:cNvSpPr>
+            <a:spLocks noGrp="1"/>
+          </p:cNvSpPr>
+          <p:nvPr>
+            <p:ph type="title"/>
+          </p:nvPr>
+        </p:nvSpPr>
+        <p:spPr/>
+        <p:txBody>
+          <a:bodyPr/>
+          <a:lstStyle/>
+          <a:p>
+            <a:endParaRPr lang="en-US"/>
+          </a:p>
+        </p:txBody>
+      </p:sp>
+      <p:sp>
+        <p:nvSpPr>
+          <p:cNvPr id="3" name="Content Placeholder 2"/>
+          <p:cNvSpPr>
+            <a:spLocks noGrp="1"/>
+          </p:cNvSpPr>
+          <p:nvPr>
+            <p:ph idx="1"/>
+          </p:nvPr>
+        </p:nvSpPr>
+        <p:spPr/>
+        <p:txBody>
+          <a:bodyPr/>
+          <a:lstStyle/>
+          <a:p>
+            <a:endParaRPr lang="en-US" dirty="0"/>
+          </a:p>
+        </p:txBody>
+      </p:sp>
+    </p:spTree>
+    <p:extLst>
+      <p:ext uri="{BB962C8B-B14F-4D97-AF65-F5344CB8AC3E}">
+        <p14:creationId xmlns:p14="http://schemas.microsoft.com/office/powerpoint/2010/main" val="3968799973"/>
+      </p:ext>
+    </p:extLst>
+  </p:cSld>
+  <p:clrMapOvr>
+    <a:masterClrMapping/>
+  </p:clrMapOvr>
+</p:sld>
+</file>
+
+<file path=ppt/slides/slide16.xml><?xml version="1.0" encoding="utf-8"?>
+<p:sld xmlns:a="http://schemas.openxmlformats.org/drawingml/2006/main" xmlns:r="http://schemas.openxmlformats.org/officeDocument/2006/relationships" xmlns:p="http://schemas.openxmlformats.org/presentationml/2006/main">
+  <p:cSld>
+    <p:spTree>
+      <p:nvGrpSpPr>
+        <p:cNvPr id="1" name=""/>
+        <p:cNvGrpSpPr/>
+        <p:nvPr/>
+      </p:nvGrpSpPr>
+      <p:grpSpPr>
+        <a:xfrm>
+          <a:off x="0" y="0"/>
+          <a:ext cx="0" cy="0"/>
+          <a:chOff x="0" y="0"/>
+          <a:chExt cx="0" cy="0"/>
+        </a:xfrm>
+      </p:grpSpPr>
+      <p:sp>
+        <p:nvSpPr>
+          <p:cNvPr id="2" name="Title 1"/>
+          <p:cNvSpPr>
+            <a:spLocks noGrp="1"/>
+          </p:cNvSpPr>
+          <p:nvPr>
             <p:ph type="title"/>
           </p:nvPr>
         </p:nvSpPr>
@@ -8755,6 +9182,61 @@
     <p:extLst>
       <p:ext uri="{BB962C8B-B14F-4D97-AF65-F5344CB8AC3E}">
         <p14:creationId xmlns:p14="http://schemas.microsoft.com/office/powerpoint/2010/main" val="4157375115"/>
+      </p:ext>
+    </p:extLst>
+  </p:cSld>
+  <p:clrMapOvr>
+    <a:masterClrMapping/>
+  </p:clrMapOvr>
+</p:sld>
+</file>
+
+<file path=ppt/slides/slide17.xml><?xml version="1.0" encoding="utf-8"?>
+<p:sld xmlns:a="http://schemas.openxmlformats.org/drawingml/2006/main" xmlns:r="http://schemas.openxmlformats.org/officeDocument/2006/relationships" xmlns:p="http://schemas.openxmlformats.org/presentationml/2006/main">
+  <p:cSld>
+    <p:spTree>
+      <p:nvGrpSpPr>
+        <p:cNvPr id="1" name=""/>
+        <p:cNvGrpSpPr/>
+        <p:nvPr/>
+      </p:nvGrpSpPr>
+      <p:grpSpPr>
+        <a:xfrm>
+          <a:off x="0" y="0"/>
+          <a:ext cx="0" cy="0"/>
+          <a:chOff x="0" y="0"/>
+          <a:chExt cx="0" cy="0"/>
+        </a:xfrm>
+      </p:grpSpPr>
+      <p:sp>
+        <p:nvSpPr>
+          <p:cNvPr id="2" name="Title 1"/>
+          <p:cNvSpPr>
+            <a:spLocks noGrp="1"/>
+          </p:cNvSpPr>
+          <p:nvPr>
+            <p:ph type="title"/>
+          </p:nvPr>
+        </p:nvSpPr>
+        <p:spPr/>
+        <p:txBody>
+          <a:bodyPr>
+            <a:normAutofit/>
+          </a:bodyPr>
+          <a:lstStyle/>
+          <a:p>
+            <a:r>
+              <a:rPr lang="en-US" sz="4800" b="1" dirty="0" smtClean="0"/>
+              <a:t>QUESTIONS?</a:t>
+            </a:r>
+            <a:endParaRPr lang="en-US" sz="4800" b="1" dirty="0"/>
+          </a:p>
+        </p:txBody>
+      </p:sp>
+    </p:spTree>
+    <p:extLst>
+      <p:ext uri="{BB962C8B-B14F-4D97-AF65-F5344CB8AC3E}">
+        <p14:creationId xmlns:p14="http://schemas.microsoft.com/office/powerpoint/2010/main" val="1078082126"/>
       </p:ext>
     </p:extLst>
   </p:cSld>
@@ -9090,107 +9572,45 @@
           <a:p>
             <a:r>
               <a:rPr lang="en-US" dirty="0" smtClean="0"/>
-              <a:t>Project</a:t>
+              <a:t>Kanban/Scrum</a:t>
             </a:r>
             <a:endParaRPr lang="en-US" dirty="0"/>
           </a:p>
         </p:txBody>
       </p:sp>
-      <p:sp>
-        <p:nvSpPr>
-          <p:cNvPr id="3" name="Content Placeholder 2"/>
-          <p:cNvSpPr>
-            <a:spLocks noGrp="1"/>
-          </p:cNvSpPr>
+      <p:pic>
+        <p:nvPicPr>
+          <p:cNvPr id="4" name="Content Placeholder 3"/>
+          <p:cNvPicPr>
+            <a:picLocks noGrp="1" noChangeAspect="1"/>
+          </p:cNvPicPr>
           <p:nvPr>
             <p:ph idx="1"/>
           </p:nvPr>
-        </p:nvSpPr>
-        <p:spPr/>
-        <p:txBody>
-          <a:bodyPr/>
-          <a:lstStyle/>
-          <a:p>
-            <a:r>
-              <a:rPr lang="en-US" dirty="0"/>
-              <a:t>PIE Project (Personal Interactive Expeditions)</a:t>
-            </a:r>
-          </a:p>
-          <a:p>
-            <a:r>
-              <a:rPr lang="en-US" dirty="0">
-                <a:latin typeface="Century Gothic" charset="0"/>
-              </a:rPr>
-              <a:t>Client: Dr. Yvonne </a:t>
-            </a:r>
-            <a:r>
-              <a:rPr lang="en-US" dirty="0" err="1">
-                <a:latin typeface="Century Gothic" charset="0"/>
-              </a:rPr>
-              <a:t>Chueh</a:t>
-            </a:r>
-            <a:endParaRPr lang="en-US" dirty="0">
-              <a:latin typeface="Century Gothic" charset="0"/>
-            </a:endParaRPr>
-          </a:p>
-          <a:p>
-            <a:r>
-              <a:rPr lang="en-US" dirty="0">
-                <a:latin typeface="Century Gothic" charset="0"/>
-              </a:rPr>
-              <a:t>Faculty Mentor: Dr.  Ed </a:t>
-            </a:r>
-            <a:r>
-              <a:rPr lang="en-US" dirty="0" err="1">
-                <a:latin typeface="Century Gothic" charset="0"/>
-              </a:rPr>
-              <a:t>Lulofs</a:t>
-            </a:r>
-            <a:endParaRPr lang="en-US" dirty="0">
-              <a:latin typeface="Century Gothic" charset="0"/>
-            </a:endParaRPr>
-          </a:p>
-          <a:p>
-            <a:r>
-              <a:rPr lang="en-US" dirty="0"/>
-              <a:t>Goal: To develop a website that will aid the elderly </a:t>
-            </a:r>
-            <a:r>
-              <a:rPr lang="en-US"/>
-              <a:t>community </a:t>
-            </a:r>
-            <a:r>
-              <a:rPr lang="en-US" smtClean="0"/>
-              <a:t>which </a:t>
-            </a:r>
-            <a:r>
-              <a:rPr lang="en-US" dirty="0"/>
-              <a:t>is facing social isolation.</a:t>
-            </a:r>
-          </a:p>
-          <a:p>
-            <a:pPr lvl="1"/>
-            <a:r>
-              <a:rPr lang="en-US" sz="1800" dirty="0"/>
-              <a:t>This site will promote social activities and outings</a:t>
-            </a:r>
-          </a:p>
-          <a:p>
-            <a:pPr lvl="1"/>
-            <a:r>
-              <a:rPr lang="en-US" sz="1800" dirty="0"/>
-              <a:t>The simple design should aid with navigation, scheduling, and more</a:t>
-            </a:r>
-          </a:p>
-          <a:p>
-            <a:endParaRPr lang="en-US" dirty="0"/>
-          </a:p>
-        </p:txBody>
-      </p:sp>
+        </p:nvPicPr>
+        <p:blipFill>
+          <a:blip r:embed="rId2">
+            <a:extLst>
+              <a:ext uri="{28A0092B-C50C-407E-A947-70E740481C1C}">
+                <a14:useLocalDpi xmlns:a14="http://schemas.microsoft.com/office/drawing/2010/main" val="0"/>
+              </a:ext>
+            </a:extLst>
+          </a:blip>
+          <a:stretch>
+            <a:fillRect/>
+          </a:stretch>
+        </p:blipFill>
+        <p:spPr>
+          <a:xfrm>
+            <a:off x="1507066" y="1264555"/>
+            <a:ext cx="9530777" cy="5576098"/>
+          </a:xfrm>
+        </p:spPr>
+      </p:pic>
     </p:spTree>
     <p:extLst>
       <p:ext uri="{BB962C8B-B14F-4D97-AF65-F5344CB8AC3E}">
-        <p14:creationId xmlns:p14="http://schemas.microsoft.com/office/powerpoint/2010/main" val="2318258539"/>
+        <p14:creationId xmlns:p14="http://schemas.microsoft.com/office/powerpoint/2010/main" val="520551229"/>
       </p:ext>
     </p:extLst>
   </p:cSld>
@@ -9234,7 +9654,7 @@
           <a:p>
             <a:r>
               <a:rPr lang="en-US" dirty="0" smtClean="0"/>
-              <a:t>Challenge</a:t>
+              <a:t>Project</a:t>
             </a:r>
             <a:endParaRPr lang="en-US" dirty="0"/>
           </a:p>
@@ -9256,33 +9676,77 @@
           <a:lstStyle/>
           <a:p>
             <a:r>
-              <a:rPr lang="en-US" dirty="0" smtClean="0"/>
-              <a:t>Seniors are facing social isolation</a:t>
-            </a:r>
-          </a:p>
-          <a:p>
-            <a:pPr marL="0" indent="0">
-              <a:buNone/>
-            </a:pPr>
-            <a:endParaRPr lang="en-US" dirty="0" smtClean="0"/>
-          </a:p>
-          <a:p>
-            <a:r>
-              <a:rPr lang="en-US" dirty="0" smtClean="0"/>
-              <a:t>No site designed for seniors to engage in social outings</a:t>
-            </a:r>
-          </a:p>
-          <a:p>
-            <a:pPr marL="0" indent="0">
-              <a:buNone/>
-            </a:pPr>
-            <a:endParaRPr lang="en-US" dirty="0" smtClean="0"/>
-          </a:p>
-          <a:p>
-            <a:r>
-              <a:rPr lang="en-US" dirty="0" smtClean="0"/>
-              <a:t>Current sites not tailored to meet challenges of aging community </a:t>
-            </a:r>
+              <a:rPr lang="en-US" dirty="0"/>
+              <a:t>PIE Project (Personal Interactive Expeditions)</a:t>
+            </a:r>
+          </a:p>
+          <a:p>
+            <a:r>
+              <a:rPr lang="en-US" dirty="0">
+                <a:latin typeface="Century Gothic" charset="0"/>
+              </a:rPr>
+              <a:t>Client: Dr. Yvonne </a:t>
+            </a:r>
+            <a:r>
+              <a:rPr lang="en-US" dirty="0" err="1">
+                <a:latin typeface="Century Gothic" charset="0"/>
+              </a:rPr>
+              <a:t>Chueh</a:t>
+            </a:r>
+            <a:endParaRPr lang="en-US" dirty="0">
+              <a:latin typeface="Century Gothic" charset="0"/>
+            </a:endParaRPr>
+          </a:p>
+          <a:p>
+            <a:r>
+              <a:rPr lang="en-US" dirty="0">
+                <a:latin typeface="Century Gothic" charset="0"/>
+              </a:rPr>
+              <a:t>Faculty Mentor: Dr.  Ed </a:t>
+            </a:r>
+            <a:r>
+              <a:rPr lang="en-US" dirty="0" err="1">
+                <a:latin typeface="Century Gothic" charset="0"/>
+              </a:rPr>
+              <a:t>Lulofs</a:t>
+            </a:r>
+            <a:endParaRPr lang="en-US" dirty="0">
+              <a:latin typeface="Century Gothic" charset="0"/>
+            </a:endParaRPr>
+          </a:p>
+          <a:p>
+            <a:r>
+              <a:rPr lang="en-US" dirty="0"/>
+              <a:t>Goal: To develop a website that will aid the elderly </a:t>
+            </a:r>
+            <a:r>
+              <a:rPr lang="en-US"/>
+              <a:t>community </a:t>
+            </a:r>
+            <a:r>
+              <a:rPr lang="en-US" smtClean="0"/>
+              <a:t>which </a:t>
+            </a:r>
+            <a:r>
+              <a:rPr lang="en-US" dirty="0"/>
+              <a:t>is facing social isolation.</a:t>
+            </a:r>
+          </a:p>
+          <a:p>
+            <a:pPr lvl="1"/>
+            <a:r>
+              <a:rPr lang="en-US" sz="1800" dirty="0"/>
+              <a:t>This site will promote social activities and outings</a:t>
+            </a:r>
+          </a:p>
+          <a:p>
+            <a:pPr lvl="1"/>
+            <a:r>
+              <a:rPr lang="en-US" sz="1800" dirty="0"/>
+              <a:t>The simple design should aid with navigation, scheduling, and more</a:t>
+            </a:r>
+          </a:p>
+          <a:p>
             <a:endParaRPr lang="en-US" dirty="0"/>
           </a:p>
         </p:txBody>
@@ -9290,7 +9754,7 @@
     </p:spTree>
     <p:extLst>
       <p:ext uri="{BB962C8B-B14F-4D97-AF65-F5344CB8AC3E}">
-        <p14:creationId xmlns:p14="http://schemas.microsoft.com/office/powerpoint/2010/main" val="2049749837"/>
+        <p14:creationId xmlns:p14="http://schemas.microsoft.com/office/powerpoint/2010/main" val="2318258539"/>
       </p:ext>
     </p:extLst>
   </p:cSld>
@@ -9334,7 +9798,7 @@
           <a:p>
             <a:r>
               <a:rPr lang="en-US" dirty="0" smtClean="0"/>
-              <a:t>Solution</a:t>
+              <a:t>Challenge</a:t>
             </a:r>
             <a:endParaRPr lang="en-US" dirty="0"/>
           </a:p>
@@ -9357,16 +9821,32 @@
           <a:p>
             <a:r>
               <a:rPr lang="en-US" dirty="0" smtClean="0"/>
-              <a:t>Developing a website that encompasses senior social activities locally.</a:t>
-            </a:r>
+              <a:t>Seniors are facing social isolation</a:t>
+            </a:r>
+          </a:p>
+          <a:p>
+            <a:pPr marL="0" indent="0">
+              <a:buNone/>
+            </a:pPr>
+            <a:endParaRPr lang="en-US" dirty="0" smtClean="0"/>
           </a:p>
           <a:p>
             <a:r>
               <a:rPr lang="en-US" dirty="0" smtClean="0"/>
-              <a:t>Minimize site learning curve </a:t>
-            </a:r>
-          </a:p>
-          <a:p>
+              <a:t>No site designed for seniors to engage in social outings</a:t>
+            </a:r>
+          </a:p>
+          <a:p>
+            <a:pPr marL="0" indent="0">
+              <a:buNone/>
+            </a:pPr>
+            <a:endParaRPr lang="en-US" dirty="0" smtClean="0"/>
+          </a:p>
+          <a:p>
+            <a:r>
+              <a:rPr lang="en-US" dirty="0" smtClean="0"/>
+              <a:t>Current sites not tailored to meet challenges of aging community </a:t>
+            </a:r>
             <a:endParaRPr lang="en-US" dirty="0"/>
           </a:p>
         </p:txBody>
@@ -9374,7 +9854,7 @@
     </p:spTree>
     <p:extLst>
       <p:ext uri="{BB962C8B-B14F-4D97-AF65-F5344CB8AC3E}">
-        <p14:creationId xmlns:p14="http://schemas.microsoft.com/office/powerpoint/2010/main" val="2031163149"/>
+        <p14:creationId xmlns:p14="http://schemas.microsoft.com/office/powerpoint/2010/main" val="2049749837"/>
       </p:ext>
     </p:extLst>
   </p:cSld>
@@ -9417,9 +9897,10 @@
           <a:lstStyle/>
           <a:p>
             <a:r>
-              <a:rPr lang="en-US" dirty="0"/>
-              <a:t>Requirements</a:t>
-            </a:r>
+              <a:rPr lang="en-US" dirty="0" smtClean="0"/>
+              <a:t>Solution</a:t>
+            </a:r>
+            <a:endParaRPr lang="en-US" dirty="0"/>
           </a:p>
         </p:txBody>
       </p:sp>
@@ -9435,64 +9916,50 @@
         </p:nvSpPr>
         <p:spPr/>
         <p:txBody>
-          <a:bodyPr vert="horz" lIns="91440" tIns="45720" rIns="91440" bIns="45720" rtlCol="0" anchor="t">
-            <a:normAutofit/>
-          </a:bodyPr>
-          <a:lstStyle/>
-          <a:p>
-            <a:r>
-              <a:rPr lang="en-US" dirty="0"/>
-              <a:t>Hardware and Software</a:t>
-            </a:r>
-          </a:p>
-          <a:p>
-            <a:pPr lvl="1"/>
-            <a:r>
-              <a:rPr lang="en-US" dirty="0">
-                <a:latin typeface="Century Gothic" charset="0"/>
-              </a:rPr>
-              <a:t>Computers with Widely-used Browsers Installed </a:t>
-            </a:r>
-          </a:p>
-          <a:p>
-            <a:pPr lvl="1"/>
-            <a:r>
-              <a:rPr lang="en-US" dirty="0">
-                <a:latin typeface="Century Gothic" charset="0"/>
-              </a:rPr>
-              <a:t>HTML, CSS, PHP, and SQL editors</a:t>
-            </a:r>
-          </a:p>
-          <a:p>
-            <a:r>
-              <a:rPr lang="en-US" dirty="0"/>
-              <a:t>User Interaction</a:t>
-            </a:r>
-          </a:p>
-          <a:p>
-            <a:r>
-              <a:rPr lang="en-US" dirty="0"/>
-              <a:t>Functional Requirements</a:t>
-            </a:r>
-          </a:p>
-          <a:p>
-            <a:r>
-              <a:rPr lang="en-US" dirty="0"/>
-              <a:t>Nonfunctional Requirements</a:t>
-            </a:r>
-          </a:p>
-          <a:p>
-            <a:r>
-              <a:rPr lang="en-US" dirty="0"/>
-              <a:t>Feasibility</a:t>
-            </a:r>
+          <a:bodyPr/>
+          <a:lstStyle/>
+          <a:p>
+            <a:r>
+              <a:rPr lang="en-US" dirty="0" smtClean="0"/>
+              <a:t>Developing a website that encompasses senior social activities locally</a:t>
+            </a:r>
+            <a:r>
+              <a:rPr lang="en-US" dirty="0" smtClean="0"/>
+              <a:t>.</a:t>
+            </a:r>
+          </a:p>
+          <a:p>
+            <a:pPr marL="0" indent="0">
+              <a:buNone/>
+            </a:pPr>
+            <a:endParaRPr lang="en-US" dirty="0" smtClean="0"/>
+          </a:p>
+          <a:p>
+            <a:r>
+              <a:rPr lang="en-US" dirty="0" smtClean="0"/>
+              <a:t>Minimize site learning curve </a:t>
+            </a:r>
+            <a:endParaRPr lang="en-US" dirty="0" smtClean="0"/>
+          </a:p>
+          <a:p>
+            <a:endParaRPr lang="en-US" dirty="0"/>
+          </a:p>
+          <a:p>
+            <a:r>
+              <a:rPr lang="en-US" dirty="0" smtClean="0"/>
+              <a:t>Connect with local businesses to promote events</a:t>
+            </a:r>
+            <a:endParaRPr lang="en-US" dirty="0" smtClean="0"/>
+          </a:p>
+          <a:p>
+            <a:endParaRPr lang="en-US" dirty="0"/>
           </a:p>
         </p:txBody>
       </p:sp>
     </p:spTree>
     <p:extLst>
       <p:ext uri="{BB962C8B-B14F-4D97-AF65-F5344CB8AC3E}">
-        <p14:creationId xmlns:p14="http://schemas.microsoft.com/office/powerpoint/2010/main" val="1876008888"/>
+        <p14:creationId xmlns:p14="http://schemas.microsoft.com/office/powerpoint/2010/main" val="2031163149"/>
       </p:ext>
     </p:extLst>
   </p:cSld>
@@ -9526,7 +9993,7 @@
             <a:spLocks noGrp="1"/>
           </p:cNvSpPr>
           <p:nvPr>
-            <p:ph type="title"/>
+            <p:ph type="ctrTitle"/>
           </p:nvPr>
         </p:nvSpPr>
         <p:spPr/>
@@ -9535,87 +10002,43 @@
           <a:lstStyle/>
           <a:p>
             <a:r>
-              <a:rPr lang="en-US" dirty="0"/>
-              <a:t>Project Management Plan</a:t>
-            </a:r>
-          </a:p>
-        </p:txBody>
-      </p:sp>
-      <p:sp>
-        <p:nvSpPr>
-          <p:cNvPr id="3" name="Content Placeholder 2"/>
-          <p:cNvSpPr>
-            <a:spLocks noGrp="1"/>
-          </p:cNvSpPr>
-          <p:nvPr>
-            <p:ph idx="1"/>
+              <a:rPr lang="en-US" dirty="0" smtClean="0"/>
+              <a:t>ABOVE INTRO</a:t>
+            </a:r>
+            <a:br>
+              <a:rPr lang="en-US" dirty="0" smtClean="0"/>
+            </a:br>
+            <a:r>
+              <a:rPr lang="en-US" dirty="0" smtClean="0"/>
+              <a:t>BELOW PROJECT REQS</a:t>
+            </a:r>
+            <a:endParaRPr lang="en-US" dirty="0"/>
+          </a:p>
+        </p:txBody>
+      </p:sp>
+      <p:sp>
+        <p:nvSpPr>
+          <p:cNvPr id="3" name="Subtitle 2"/>
+          <p:cNvSpPr>
+            <a:spLocks noGrp="1"/>
+          </p:cNvSpPr>
+          <p:nvPr>
+            <p:ph type="subTitle" idx="1"/>
           </p:nvPr>
         </p:nvSpPr>
         <p:spPr/>
         <p:txBody>
-          <a:bodyPr vert="horz" lIns="91440" tIns="45720" rIns="91440" bIns="45720" rtlCol="0" anchor="t">
-            <a:normAutofit/>
-          </a:bodyPr>
-          <a:lstStyle/>
-          <a:p>
-            <a:r>
-              <a:rPr lang="en-US" dirty="0"/>
-              <a:t>Project Organization</a:t>
-            </a:r>
-          </a:p>
-          <a:p>
-            <a:pPr lvl="1"/>
-            <a:r>
-              <a:rPr lang="en-US" sz="1800" dirty="0" smtClean="0"/>
-              <a:t>Scrum/Kanban process (Trello)</a:t>
-            </a:r>
-            <a:endParaRPr lang="en-US" sz="1800" dirty="0"/>
-          </a:p>
-          <a:p>
-            <a:r>
-              <a:rPr lang="en-US" dirty="0"/>
-              <a:t>Risk Analysis</a:t>
-            </a:r>
-          </a:p>
-          <a:p>
-            <a:pPr lvl="1"/>
-            <a:r>
-              <a:rPr lang="en-US" sz="1800" dirty="0"/>
-              <a:t>Feature Overload</a:t>
-            </a:r>
-          </a:p>
-          <a:p>
-            <a:r>
-              <a:rPr lang="en-US" dirty="0"/>
-              <a:t>Hardware/Software Requirements</a:t>
-            </a:r>
-          </a:p>
-          <a:p>
-            <a:r>
-              <a:rPr lang="en-US" dirty="0"/>
-              <a:t>Project Schedule</a:t>
-            </a:r>
-          </a:p>
-          <a:p>
-            <a:pPr lvl="1"/>
-            <a:r>
-              <a:rPr lang="en-US" sz="1800" dirty="0"/>
-              <a:t>Reach new milestones each 2-week sprint</a:t>
-            </a:r>
-          </a:p>
-          <a:p>
-            <a:pPr lvl="1"/>
-            <a:r>
-              <a:rPr lang="en-US" sz="1800" dirty="0"/>
-              <a:t>SCRUM meetings and Client Meetings</a:t>
-            </a:r>
+          <a:bodyPr/>
+          <a:lstStyle/>
+          <a:p>
+            <a:endParaRPr lang="en-US"/>
           </a:p>
         </p:txBody>
       </p:sp>
     </p:spTree>
     <p:extLst>
       <p:ext uri="{BB962C8B-B14F-4D97-AF65-F5344CB8AC3E}">
-        <p14:creationId xmlns:p14="http://schemas.microsoft.com/office/powerpoint/2010/main" val="1768054810"/>
+        <p14:creationId xmlns:p14="http://schemas.microsoft.com/office/powerpoint/2010/main" val="91013316"/>
       </p:ext>
     </p:extLst>
   </p:cSld>
@@ -9658,10 +10081,9 @@
           <a:lstStyle/>
           <a:p>
             <a:r>
-              <a:rPr lang="en-US" dirty="0" smtClean="0"/>
-              <a:t>QA Plan</a:t>
-            </a:r>
-            <a:endParaRPr lang="en-US" dirty="0"/>
+              <a:rPr lang="en-US" dirty="0"/>
+              <a:t>Requirements</a:t>
+            </a:r>
           </a:p>
         </p:txBody>
       </p:sp>
@@ -9677,17 +10099,85 @@
         </p:nvSpPr>
         <p:spPr/>
         <p:txBody>
-          <a:bodyPr/>
-          <a:lstStyle/>
-          <a:p>
-            <a:endParaRPr lang="en-US"/>
+          <a:bodyPr vert="horz" lIns="91440" tIns="45720" rIns="91440" bIns="45720" rtlCol="0" anchor="t">
+            <a:normAutofit/>
+          </a:bodyPr>
+          <a:lstStyle/>
+          <a:p>
+            <a:r>
+              <a:rPr lang="en-US" dirty="0"/>
+              <a:t>Hardware and Software</a:t>
+            </a:r>
+          </a:p>
+          <a:p>
+            <a:pPr lvl="1"/>
+            <a:r>
+              <a:rPr lang="en-US" dirty="0">
+                <a:latin typeface="Century Gothic" charset="0"/>
+              </a:rPr>
+              <a:t>Computers with Widely-used Browsers Installed </a:t>
+            </a:r>
+          </a:p>
+          <a:p>
+            <a:pPr lvl="1"/>
+            <a:r>
+              <a:rPr lang="en-US" dirty="0">
+                <a:latin typeface="Century Gothic" charset="0"/>
+              </a:rPr>
+              <a:t>HTML, CSS</a:t>
+            </a:r>
+            <a:r>
+              <a:rPr lang="en-US" dirty="0" smtClean="0">
+                <a:latin typeface="Century Gothic" charset="0"/>
+              </a:rPr>
+              <a:t>, JavaScript, </a:t>
+            </a:r>
+            <a:r>
+              <a:rPr lang="en-US" dirty="0">
+                <a:latin typeface="Century Gothic" charset="0"/>
+              </a:rPr>
+              <a:t>PHP, and </a:t>
+            </a:r>
+            <a:r>
+              <a:rPr lang="en-US" dirty="0" smtClean="0">
+                <a:latin typeface="Century Gothic" charset="0"/>
+              </a:rPr>
+              <a:t>MySQL</a:t>
+            </a:r>
+            <a:endParaRPr lang="en-US" dirty="0">
+              <a:latin typeface="Century Gothic" charset="0"/>
+            </a:endParaRPr>
+          </a:p>
+          <a:p>
+            <a:r>
+              <a:rPr lang="en-US" dirty="0"/>
+              <a:t>User Interaction</a:t>
+            </a:r>
+          </a:p>
+          <a:p>
+            <a:r>
+              <a:rPr lang="en-US" dirty="0"/>
+              <a:t>Functional Requirements</a:t>
+            </a:r>
+          </a:p>
+          <a:p>
+            <a:r>
+              <a:rPr lang="en-US" dirty="0"/>
+              <a:t>Nonfunctional Requirements</a:t>
+            </a:r>
+          </a:p>
+          <a:p>
+            <a:r>
+              <a:rPr lang="en-US" dirty="0"/>
+              <a:t>Feasibility</a:t>
+            </a:r>
           </a:p>
         </p:txBody>
       </p:sp>
     </p:spTree>
     <p:extLst>
       <p:ext uri="{BB962C8B-B14F-4D97-AF65-F5344CB8AC3E}">
-        <p14:creationId xmlns:p14="http://schemas.microsoft.com/office/powerpoint/2010/main" val="4148209602"/>
+        <p14:creationId xmlns:p14="http://schemas.microsoft.com/office/powerpoint/2010/main" val="1876008888"/>
       </p:ext>
     </p:extLst>
   </p:cSld>

</xml_diff>

<commit_message>
Another update of PP
</commit_message>
<xml_diff>
--- a/Presentation/12.8.15 Presentation (Revised).pptx
+++ b/Presentation/12.8.15 Presentation (Revised).pptx
@@ -5,7 +5,7 @@
     <p:sldMasterId id="2147483648" r:id="rId1"/>
   </p:sldMasterIdLst>
   <p:notesMasterIdLst>
-    <p:notesMasterId r:id="rId19"/>
+    <p:notesMasterId r:id="rId21"/>
   </p:notesMasterIdLst>
   <p:sldIdLst>
     <p:sldId id="256" r:id="rId2"/>
@@ -17,14 +17,16 @@
     <p:sldId id="265" r:id="rId8"/>
     <p:sldId id="269" r:id="rId9"/>
     <p:sldId id="260" r:id="rId10"/>
-    <p:sldId id="258" r:id="rId11"/>
-    <p:sldId id="270" r:id="rId12"/>
-    <p:sldId id="262" r:id="rId13"/>
-    <p:sldId id="266" r:id="rId14"/>
-    <p:sldId id="272" r:id="rId15"/>
-    <p:sldId id="273" r:id="rId16"/>
-    <p:sldId id="267" r:id="rId17"/>
-    <p:sldId id="271" r:id="rId18"/>
+    <p:sldId id="274" r:id="rId11"/>
+    <p:sldId id="275" r:id="rId12"/>
+    <p:sldId id="258" r:id="rId13"/>
+    <p:sldId id="270" r:id="rId14"/>
+    <p:sldId id="262" r:id="rId15"/>
+    <p:sldId id="266" r:id="rId16"/>
+    <p:sldId id="272" r:id="rId17"/>
+    <p:sldId id="273" r:id="rId18"/>
+    <p:sldId id="267" r:id="rId19"/>
+    <p:sldId id="271" r:id="rId20"/>
   </p:sldIdLst>
   <p:sldSz cx="12192000" cy="6858000"/>
   <p:notesSz cx="6858000" cy="9144000"/>
@@ -914,7 +916,7 @@
           <a:p>
             <a:fld id="{7D90AB93-7EBB-40C3-AABE-B1527F40B7D6}" type="slidenum">
               <a:rPr lang="en-US"/>
-              <a:t>10</a:t>
+              <a:t>12</a:t>
             </a:fld>
             <a:endParaRPr lang="en-US"/>
           </a:p>
@@ -998,7 +1000,7 @@
           <a:p>
             <a:fld id="{7D90AB93-7EBB-40C3-AABE-B1527F40B7D6}" type="slidenum">
               <a:rPr lang="en-US"/>
-              <a:t>12</a:t>
+              <a:t>14</a:t>
             </a:fld>
             <a:endParaRPr lang="en-US"/>
           </a:p>
@@ -8660,9 +8662,10 @@
           <a:lstStyle/>
           <a:p>
             <a:r>
-              <a:rPr lang="en-US" dirty="0"/>
-              <a:t>Project Management Plan</a:t>
-            </a:r>
+              <a:rPr lang="en-US" dirty="0" smtClean="0"/>
+              <a:t>Hardware and Software</a:t>
+            </a:r>
+            <a:endParaRPr lang="en-US" dirty="0"/>
           </a:p>
         </p:txBody>
       </p:sp>
@@ -8678,69 +8681,48 @@
         </p:nvSpPr>
         <p:spPr/>
         <p:txBody>
-          <a:bodyPr vert="horz" lIns="91440" tIns="45720" rIns="91440" bIns="45720" rtlCol="0" anchor="t">
-            <a:normAutofit/>
-          </a:bodyPr>
-          <a:lstStyle/>
-          <a:p>
-            <a:r>
-              <a:rPr lang="en-US" dirty="0"/>
-              <a:t>Project Organization</a:t>
-            </a:r>
-          </a:p>
-          <a:p>
-            <a:pPr lvl="1"/>
-            <a:r>
-              <a:rPr lang="en-US" sz="1800" dirty="0" smtClean="0"/>
-              <a:t>Scrum/Kanban process (Trello)</a:t>
-            </a:r>
-            <a:endParaRPr lang="en-US" sz="1800" dirty="0"/>
-          </a:p>
-          <a:p>
-            <a:r>
-              <a:rPr lang="en-US" dirty="0"/>
-              <a:t>Risk Analysis</a:t>
-            </a:r>
-          </a:p>
-          <a:p>
-            <a:pPr lvl="1"/>
-            <a:r>
-              <a:rPr lang="en-US" sz="1800" dirty="0"/>
-              <a:t>Feature Overload</a:t>
-            </a:r>
-          </a:p>
-          <a:p>
-            <a:r>
-              <a:rPr lang="en-US" dirty="0"/>
-              <a:t>Hardware/Software Requirements</a:t>
-            </a:r>
-          </a:p>
-          <a:p>
-            <a:r>
-              <a:rPr lang="en-US" dirty="0"/>
-              <a:t>Project Schedule</a:t>
-            </a:r>
-          </a:p>
-          <a:p>
-            <a:pPr lvl="1"/>
-            <a:r>
-              <a:rPr lang="en-US" sz="1800" dirty="0"/>
-              <a:t>Reach new milestones each 2-week sprint</a:t>
-            </a:r>
-          </a:p>
-          <a:p>
-            <a:pPr lvl="1"/>
-            <a:r>
-              <a:rPr lang="en-US" sz="1800" dirty="0"/>
-              <a:t>SCRUM meetings and Client Meetings</a:t>
-            </a:r>
+          <a:bodyPr/>
+          <a:lstStyle/>
+          <a:p>
+            <a:r>
+              <a:rPr lang="en-US" dirty="0" smtClean="0"/>
+              <a:t>Optimize for most prominent browser.</a:t>
+            </a:r>
+          </a:p>
+          <a:p>
+            <a:r>
+              <a:rPr lang="en-US" dirty="0" smtClean="0"/>
+              <a:t>Compatible with older versions. </a:t>
+            </a:r>
+            <a:endParaRPr lang="en-US" dirty="0"/>
+          </a:p>
+          <a:p>
+            <a:r>
+              <a:rPr lang="en-US" dirty="0" smtClean="0"/>
+              <a:t>Using HTML, CSS, JavaScript, PHP, MySQL</a:t>
+            </a:r>
+          </a:p>
+          <a:p>
+            <a:r>
+              <a:rPr lang="en-US" dirty="0" smtClean="0"/>
+              <a:t>MySQL Database</a:t>
+            </a:r>
+          </a:p>
+          <a:p>
+            <a:r>
+              <a:rPr lang="en-US" dirty="0" smtClean="0"/>
+              <a:t>Hosting site</a:t>
+            </a:r>
+          </a:p>
+          <a:p>
+            <a:endParaRPr lang="en-US" dirty="0"/>
           </a:p>
         </p:txBody>
       </p:sp>
     </p:spTree>
     <p:extLst>
       <p:ext uri="{BB962C8B-B14F-4D97-AF65-F5344CB8AC3E}">
-        <p14:creationId xmlns:p14="http://schemas.microsoft.com/office/powerpoint/2010/main" val="1768054810"/>
+        <p14:creationId xmlns:p14="http://schemas.microsoft.com/office/powerpoint/2010/main" val="2349178812"/>
       </p:ext>
     </p:extLst>
   </p:cSld>
@@ -8774,7 +8756,7 @@
             <a:spLocks noGrp="1"/>
           </p:cNvSpPr>
           <p:nvPr>
-            <p:ph type="ctrTitle"/>
+            <p:ph type="title"/>
           </p:nvPr>
         </p:nvSpPr>
         <p:spPr/>
@@ -8784,42 +8766,87 @@
           <a:p>
             <a:r>
               <a:rPr lang="en-US" dirty="0" smtClean="0"/>
-              <a:t>REQS ABOVE</a:t>
-            </a:r>
-            <a:br>
+              <a:t>Project Requirements</a:t>
+            </a:r>
+            <a:endParaRPr lang="en-US" dirty="0"/>
+          </a:p>
+        </p:txBody>
+      </p:sp>
+      <p:sp>
+        <p:nvSpPr>
+          <p:cNvPr id="3" name="Content Placeholder 2"/>
+          <p:cNvSpPr>
+            <a:spLocks noGrp="1"/>
+          </p:cNvSpPr>
+          <p:nvPr>
+            <p:ph idx="1"/>
+          </p:nvPr>
+        </p:nvSpPr>
+        <p:spPr/>
+        <p:txBody>
+          <a:bodyPr/>
+          <a:lstStyle/>
+          <a:p>
+            <a:r>
+              <a:rPr lang="en-US" dirty="0"/>
+              <a:t>Easy to use </a:t>
+            </a:r>
+            <a:r>
               <a:rPr lang="en-US" dirty="0" smtClean="0"/>
-            </a:br>
+              <a:t>interface</a:t>
+            </a:r>
+          </a:p>
+          <a:p>
             <a:r>
               <a:rPr lang="en-US" dirty="0" smtClean="0"/>
-              <a:t>PROTOTYPE DEMO BELOW</a:t>
-            </a:r>
+              <a:t>Create account</a:t>
+            </a:r>
+          </a:p>
+          <a:p>
+            <a:r>
+              <a:rPr lang="en-US" dirty="0" smtClean="0"/>
+              <a:t>Create Groups</a:t>
+            </a:r>
+          </a:p>
+          <a:p>
+            <a:r>
+              <a:rPr lang="en-US" dirty="0" smtClean="0"/>
+              <a:t>Create Events</a:t>
+            </a:r>
+          </a:p>
+          <a:p>
+            <a:r>
+              <a:rPr lang="en-US" dirty="0" smtClean="0"/>
+              <a:t>Invite Family/Friends</a:t>
+            </a:r>
+          </a:p>
+          <a:p>
+            <a:r>
+              <a:rPr lang="en-US" dirty="0" smtClean="0"/>
+              <a:t>Post and share photos</a:t>
+            </a:r>
+          </a:p>
+          <a:p>
+            <a:r>
+              <a:rPr lang="en-US" dirty="0" smtClean="0"/>
+              <a:t>View local events</a:t>
+            </a:r>
+          </a:p>
+          <a:p>
+            <a:r>
+              <a:rPr lang="en-US" dirty="0" smtClean="0"/>
+              <a:t>Special local deals</a:t>
+            </a:r>
+          </a:p>
+          <a:p>
             <a:endParaRPr lang="en-US" dirty="0"/>
-          </a:p>
-        </p:txBody>
-      </p:sp>
-      <p:sp>
-        <p:nvSpPr>
-          <p:cNvPr id="3" name="Subtitle 2"/>
-          <p:cNvSpPr>
-            <a:spLocks noGrp="1"/>
-          </p:cNvSpPr>
-          <p:nvPr>
-            <p:ph type="subTitle" idx="1"/>
-          </p:nvPr>
-        </p:nvSpPr>
-        <p:spPr/>
-        <p:txBody>
-          <a:bodyPr/>
-          <a:lstStyle/>
-          <a:p>
-            <a:endParaRPr lang="en-US"/>
           </a:p>
         </p:txBody>
       </p:sp>
     </p:spTree>
     <p:extLst>
       <p:ext uri="{BB962C8B-B14F-4D97-AF65-F5344CB8AC3E}">
-        <p14:creationId xmlns:p14="http://schemas.microsoft.com/office/powerpoint/2010/main" val="51987764"/>
+        <p14:creationId xmlns:p14="http://schemas.microsoft.com/office/powerpoint/2010/main" val="3788729043"/>
       </p:ext>
     </p:extLst>
   </p:cSld>
@@ -8863,7 +8890,7 @@
           <a:p>
             <a:r>
               <a:rPr lang="en-US" dirty="0"/>
-              <a:t>Prototype</a:t>
+              <a:t>Project Management Plan</a:t>
             </a:r>
           </a:p>
         </p:txBody>
@@ -8880,17 +8907,69 @@
         </p:nvSpPr>
         <p:spPr/>
         <p:txBody>
-          <a:bodyPr/>
-          <a:lstStyle/>
-          <a:p>
-            <a:endParaRPr lang="en-US"/>
+          <a:bodyPr vert="horz" lIns="91440" tIns="45720" rIns="91440" bIns="45720" rtlCol="0" anchor="t">
+            <a:normAutofit/>
+          </a:bodyPr>
+          <a:lstStyle/>
+          <a:p>
+            <a:r>
+              <a:rPr lang="en-US" dirty="0"/>
+              <a:t>Project Organization</a:t>
+            </a:r>
+          </a:p>
+          <a:p>
+            <a:pPr lvl="1"/>
+            <a:r>
+              <a:rPr lang="en-US" sz="1800" dirty="0" smtClean="0"/>
+              <a:t>Scrum/Kanban process (Trello)</a:t>
+            </a:r>
+            <a:endParaRPr lang="en-US" sz="1800" dirty="0"/>
+          </a:p>
+          <a:p>
+            <a:r>
+              <a:rPr lang="en-US" dirty="0"/>
+              <a:t>Risk Analysis</a:t>
+            </a:r>
+          </a:p>
+          <a:p>
+            <a:pPr lvl="1"/>
+            <a:r>
+              <a:rPr lang="en-US" sz="1800" dirty="0"/>
+              <a:t>Feature Overload</a:t>
+            </a:r>
+          </a:p>
+          <a:p>
+            <a:r>
+              <a:rPr lang="en-US" dirty="0"/>
+              <a:t>Hardware/Software Requirements</a:t>
+            </a:r>
+          </a:p>
+          <a:p>
+            <a:r>
+              <a:rPr lang="en-US" dirty="0"/>
+              <a:t>Project Schedule</a:t>
+            </a:r>
+          </a:p>
+          <a:p>
+            <a:pPr lvl="1"/>
+            <a:r>
+              <a:rPr lang="en-US" sz="1800" dirty="0"/>
+              <a:t>Reach new milestones each 2-week sprint</a:t>
+            </a:r>
+          </a:p>
+          <a:p>
+            <a:pPr lvl="1"/>
+            <a:r>
+              <a:rPr lang="en-US" sz="1800" dirty="0"/>
+              <a:t>SCRUM meetings and Client Meetings</a:t>
+            </a:r>
           </a:p>
         </p:txBody>
       </p:sp>
     </p:spTree>
     <p:extLst>
       <p:ext uri="{BB962C8B-B14F-4D97-AF65-F5344CB8AC3E}">
-        <p14:creationId xmlns:p14="http://schemas.microsoft.com/office/powerpoint/2010/main" val="2018556856"/>
+        <p14:creationId xmlns:p14="http://schemas.microsoft.com/office/powerpoint/2010/main" val="1768054810"/>
       </p:ext>
     </p:extLst>
   </p:cSld>
@@ -8924,7 +9003,7 @@
             <a:spLocks noGrp="1"/>
           </p:cNvSpPr>
           <p:nvPr>
-            <p:ph type="title"/>
+            <p:ph type="ctrTitle"/>
           </p:nvPr>
         </p:nvSpPr>
         <p:spPr/>
@@ -8934,14 +9013,14 @@
           <a:p>
             <a:r>
               <a:rPr lang="en-US" dirty="0" smtClean="0"/>
-              <a:t>PROTOTYPE ABOVE</a:t>
+              <a:t>REQS ABOVE</a:t>
             </a:r>
             <a:br>
               <a:rPr lang="en-US" dirty="0" smtClean="0"/>
             </a:br>
             <a:r>
               <a:rPr lang="en-US" dirty="0" smtClean="0"/>
-              <a:t>QA RISK ANALYSIS BELOW</a:t>
+              <a:t>PROTOTYPE DEMO BELOW</a:t>
             </a:r>
             <a:endParaRPr lang="en-US" dirty="0"/>
           </a:p>
@@ -8949,12 +9028,12 @@
       </p:sp>
       <p:sp>
         <p:nvSpPr>
-          <p:cNvPr id="3" name="Content Placeholder 2"/>
-          <p:cNvSpPr>
-            <a:spLocks noGrp="1"/>
-          </p:cNvSpPr>
-          <p:nvPr>
-            <p:ph idx="1"/>
+          <p:cNvPr id="3" name="Subtitle 2"/>
+          <p:cNvSpPr>
+            <a:spLocks noGrp="1"/>
+          </p:cNvSpPr>
+          <p:nvPr>
+            <p:ph type="subTitle" idx="1"/>
           </p:nvPr>
         </p:nvSpPr>
         <p:spPr/>
@@ -8962,14 +9041,14 @@
           <a:bodyPr/>
           <a:lstStyle/>
           <a:p>
-            <a:endParaRPr lang="en-US" dirty="0"/>
+            <a:endParaRPr lang="en-US"/>
           </a:p>
         </p:txBody>
       </p:sp>
     </p:spTree>
     <p:extLst>
       <p:ext uri="{BB962C8B-B14F-4D97-AF65-F5344CB8AC3E}">
-        <p14:creationId xmlns:p14="http://schemas.microsoft.com/office/powerpoint/2010/main" val="4148209602"/>
+        <p14:creationId xmlns:p14="http://schemas.microsoft.com/office/powerpoint/2010/main" val="51987764"/>
       </p:ext>
     </p:extLst>
   </p:cSld>
@@ -9012,10 +9091,9 @@
           <a:lstStyle/>
           <a:p>
             <a:r>
-              <a:rPr lang="en-US" dirty="0" smtClean="0"/>
-              <a:t>QUALITY ASSURANCE</a:t>
-            </a:r>
-            <a:endParaRPr lang="en-US" dirty="0"/>
+              <a:rPr lang="en-US" dirty="0"/>
+              <a:t>Prototype</a:t>
+            </a:r>
           </a:p>
         </p:txBody>
       </p:sp>
@@ -9041,7 +9119,7 @@
     </p:spTree>
     <p:extLst>
       <p:ext uri="{BB962C8B-B14F-4D97-AF65-F5344CB8AC3E}">
-        <p14:creationId xmlns:p14="http://schemas.microsoft.com/office/powerpoint/2010/main" val="3755474298"/>
+        <p14:creationId xmlns:p14="http://schemas.microsoft.com/office/powerpoint/2010/main" val="2018556856"/>
       </p:ext>
     </p:extLst>
   </p:cSld>
@@ -9083,7 +9161,18 @@
           <a:bodyPr/>
           <a:lstStyle/>
           <a:p>
-            <a:endParaRPr lang="en-US"/>
+            <a:r>
+              <a:rPr lang="en-US" dirty="0" smtClean="0"/>
+              <a:t>PROTOTYPE ABOVE</a:t>
+            </a:r>
+            <a:br>
+              <a:rPr lang="en-US" dirty="0" smtClean="0"/>
+            </a:br>
+            <a:r>
+              <a:rPr lang="en-US" dirty="0" smtClean="0"/>
+              <a:t>QA RISK ANALYSIS BELOW</a:t>
+            </a:r>
+            <a:endParaRPr lang="en-US" dirty="0"/>
           </a:p>
         </p:txBody>
       </p:sp>
@@ -9109,7 +9198,7 @@
     </p:spTree>
     <p:extLst>
       <p:ext uri="{BB962C8B-B14F-4D97-AF65-F5344CB8AC3E}">
-        <p14:creationId xmlns:p14="http://schemas.microsoft.com/office/powerpoint/2010/main" val="3968799973"/>
+        <p14:creationId xmlns:p14="http://schemas.microsoft.com/office/powerpoint/2010/main" val="4148209602"/>
       </p:ext>
     </p:extLst>
   </p:cSld>
@@ -9153,6 +9242,150 @@
           <a:p>
             <a:r>
               <a:rPr lang="en-US" dirty="0" smtClean="0"/>
+              <a:t>QUALITY ASSURANCE</a:t>
+            </a:r>
+            <a:endParaRPr lang="en-US" dirty="0"/>
+          </a:p>
+        </p:txBody>
+      </p:sp>
+      <p:sp>
+        <p:nvSpPr>
+          <p:cNvPr id="3" name="Content Placeholder 2"/>
+          <p:cNvSpPr>
+            <a:spLocks noGrp="1"/>
+          </p:cNvSpPr>
+          <p:nvPr>
+            <p:ph idx="1"/>
+          </p:nvPr>
+        </p:nvSpPr>
+        <p:spPr/>
+        <p:txBody>
+          <a:bodyPr/>
+          <a:lstStyle/>
+          <a:p>
+            <a:endParaRPr lang="en-US"/>
+          </a:p>
+        </p:txBody>
+      </p:sp>
+    </p:spTree>
+    <p:extLst>
+      <p:ext uri="{BB962C8B-B14F-4D97-AF65-F5344CB8AC3E}">
+        <p14:creationId xmlns:p14="http://schemas.microsoft.com/office/powerpoint/2010/main" val="3755474298"/>
+      </p:ext>
+    </p:extLst>
+  </p:cSld>
+  <p:clrMapOvr>
+    <a:masterClrMapping/>
+  </p:clrMapOvr>
+</p:sld>
+</file>
+
+<file path=ppt/slides/slide17.xml><?xml version="1.0" encoding="utf-8"?>
+<p:sld xmlns:a="http://schemas.openxmlformats.org/drawingml/2006/main" xmlns:r="http://schemas.openxmlformats.org/officeDocument/2006/relationships" xmlns:p="http://schemas.openxmlformats.org/presentationml/2006/main">
+  <p:cSld>
+    <p:spTree>
+      <p:nvGrpSpPr>
+        <p:cNvPr id="1" name=""/>
+        <p:cNvGrpSpPr/>
+        <p:nvPr/>
+      </p:nvGrpSpPr>
+      <p:grpSpPr>
+        <a:xfrm>
+          <a:off x="0" y="0"/>
+          <a:ext cx="0" cy="0"/>
+          <a:chOff x="0" y="0"/>
+          <a:chExt cx="0" cy="0"/>
+        </a:xfrm>
+      </p:grpSpPr>
+      <p:sp>
+        <p:nvSpPr>
+          <p:cNvPr id="2" name="Title 1"/>
+          <p:cNvSpPr>
+            <a:spLocks noGrp="1"/>
+          </p:cNvSpPr>
+          <p:nvPr>
+            <p:ph type="title"/>
+          </p:nvPr>
+        </p:nvSpPr>
+        <p:spPr/>
+        <p:txBody>
+          <a:bodyPr/>
+          <a:lstStyle/>
+          <a:p>
+            <a:r>
+              <a:rPr lang="en-US" dirty="0" smtClean="0"/>
+              <a:t>Risk Analysis</a:t>
+            </a:r>
+            <a:endParaRPr lang="en-US" dirty="0"/>
+          </a:p>
+        </p:txBody>
+      </p:sp>
+      <p:sp>
+        <p:nvSpPr>
+          <p:cNvPr id="3" name="Content Placeholder 2"/>
+          <p:cNvSpPr>
+            <a:spLocks noGrp="1"/>
+          </p:cNvSpPr>
+          <p:nvPr>
+            <p:ph idx="1"/>
+          </p:nvPr>
+        </p:nvSpPr>
+        <p:spPr/>
+        <p:txBody>
+          <a:bodyPr/>
+          <a:lstStyle/>
+          <a:p>
+            <a:endParaRPr lang="en-US" dirty="0"/>
+          </a:p>
+        </p:txBody>
+      </p:sp>
+    </p:spTree>
+    <p:extLst>
+      <p:ext uri="{BB962C8B-B14F-4D97-AF65-F5344CB8AC3E}">
+        <p14:creationId xmlns:p14="http://schemas.microsoft.com/office/powerpoint/2010/main" val="3968799973"/>
+      </p:ext>
+    </p:extLst>
+  </p:cSld>
+  <p:clrMapOvr>
+    <a:masterClrMapping/>
+  </p:clrMapOvr>
+</p:sld>
+</file>
+
+<file path=ppt/slides/slide18.xml><?xml version="1.0" encoding="utf-8"?>
+<p:sld xmlns:a="http://schemas.openxmlformats.org/drawingml/2006/main" xmlns:r="http://schemas.openxmlformats.org/officeDocument/2006/relationships" xmlns:p="http://schemas.openxmlformats.org/presentationml/2006/main">
+  <p:cSld>
+    <p:spTree>
+      <p:nvGrpSpPr>
+        <p:cNvPr id="1" name=""/>
+        <p:cNvGrpSpPr/>
+        <p:nvPr/>
+      </p:nvGrpSpPr>
+      <p:grpSpPr>
+        <a:xfrm>
+          <a:off x="0" y="0"/>
+          <a:ext cx="0" cy="0"/>
+          <a:chOff x="0" y="0"/>
+          <a:chExt cx="0" cy="0"/>
+        </a:xfrm>
+      </p:grpSpPr>
+      <p:sp>
+        <p:nvSpPr>
+          <p:cNvPr id="2" name="Title 1"/>
+          <p:cNvSpPr>
+            <a:spLocks noGrp="1"/>
+          </p:cNvSpPr>
+          <p:nvPr>
+            <p:ph type="title"/>
+          </p:nvPr>
+        </p:nvSpPr>
+        <p:spPr/>
+        <p:txBody>
+          <a:bodyPr/>
+          <a:lstStyle/>
+          <a:p>
+            <a:r>
+              <a:rPr lang="en-US" dirty="0" smtClean="0"/>
               <a:t>Conclusion</a:t>
             </a:r>
             <a:endParaRPr lang="en-US" dirty="0"/>
@@ -9191,7 +9424,7 @@
 </p:sld>
 </file>
 
-<file path=ppt/slides/slide17.xml><?xml version="1.0" encoding="utf-8"?>
+<file path=ppt/slides/slide19.xml><?xml version="1.0" encoding="utf-8"?>
 <p:sld xmlns:a="http://schemas.openxmlformats.org/drawingml/2006/main" xmlns:r="http://schemas.openxmlformats.org/officeDocument/2006/relationships" xmlns:p="http://schemas.openxmlformats.org/presentationml/2006/main">
   <p:cSld>
     <p:spTree>
@@ -9921,11 +10154,7 @@
           <a:p>
             <a:r>
               <a:rPr lang="en-US" dirty="0" smtClean="0"/>
-              <a:t>Developing a website that encompasses senior social activities locally</a:t>
-            </a:r>
-            <a:r>
-              <a:rPr lang="en-US" dirty="0" smtClean="0"/>
-              <a:t>.</a:t>
+              <a:t>Developing a website that encompasses senior social activities locally.</a:t>
             </a:r>
           </a:p>
           <a:p>
@@ -9939,7 +10168,6 @@
               <a:rPr lang="en-US" dirty="0" smtClean="0"/>
               <a:t>Minimize site learning curve </a:t>
             </a:r>
-            <a:endParaRPr lang="en-US" dirty="0" smtClean="0"/>
           </a:p>
           <a:p>
             <a:endParaRPr lang="en-US" dirty="0"/>
@@ -9949,7 +10177,6 @@
               <a:rPr lang="en-US" dirty="0" smtClean="0"/>
               <a:t>Connect with local businesses to promote events</a:t>
             </a:r>
-            <a:endParaRPr lang="en-US" dirty="0" smtClean="0"/>
           </a:p>
           <a:p>
             <a:endParaRPr lang="en-US" dirty="0"/>

</xml_diff>